<commit_message>
remove gif images from imagelist
</commit_message>
<xml_diff>
--- a/docs/diagrams/OpenSequenceDiagram.pptx
+++ b/docs/diagrams/OpenSequenceDiagram.pptx
@@ -6463,12 +6463,12 @@
         </p:nvCxnSpPr>
         <p:spPr>
           <a:xfrm rot="16200000" flipH="1">
-            <a:off x="7271500" y="4847042"/>
+            <a:off x="7278247" y="4764607"/>
             <a:ext cx="92128" cy="96955"/>
           </a:xfrm>
           <a:prstGeom prst="curvedConnector4">
             <a:avLst>
-              <a:gd name="adj1" fmla="val -78571"/>
+              <a:gd name="adj1" fmla="val 7"/>
               <a:gd name="adj2" fmla="val 268936"/>
             </a:avLst>
           </a:prstGeom>
@@ -6506,14 +6506,13 @@
           <p:nvPr/>
         </p:nvCxnSpPr>
         <p:spPr>
-          <a:xfrm rot="16200000" flipH="1">
-            <a:off x="7271500" y="5244308"/>
-            <a:ext cx="92128" cy="96955"/>
-          </a:xfrm>
-          <a:prstGeom prst="curvedConnector4">
+          <a:xfrm>
+            <a:off x="7264964" y="5182658"/>
+            <a:ext cx="102963" cy="62040"/>
+          </a:xfrm>
+          <a:prstGeom prst="curvedConnector3">
             <a:avLst>
-              <a:gd name="adj1" fmla="val -57893"/>
-              <a:gd name="adj2" fmla="val 268936"/>
+              <a:gd name="adj1" fmla="val 227618"/>
             </a:avLst>
           </a:prstGeom>
           <a:ln>

</xml_diff>